<commit_message>
agregado de conf. git
</commit_message>
<xml_diff>
--- a/docs/.NET Standard - One Library to Rule Them All - NET Conf Uy 2017.pptx
+++ b/docs/.NET Standard - One Library to Rule Them All - NET Conf Uy 2017.pptx
@@ -1119,6 +1119,15 @@
               <ac:grpSpMk id="108" creationId="{555ECBFC-D0E1-4B34-B137-E3659C9CFD1D}"/>
             </ac:grpSpMkLst>
           </pc:grpChg>
+          <pc:grpChg chg="add mod">
+            <ac:chgData name="Fabian Imaz" userId="b162d828-336d-4287-a4f3-91a93e080f29" providerId="ADAL" clId="{8D7B119D-814E-4B1A-809A-61644D08B2FA}" dt="2017-10-09T22:34:31.937" v="45" actId="1076"/>
+            <ac:grpSpMkLst>
+              <pc:docMk/>
+              <pc:sldMasterMk cId="702745799" sldId="2147483658"/>
+              <pc:sldLayoutMk cId="0" sldId="2147483660"/>
+              <ac:grpSpMk id="111" creationId="{1CC7FA66-1BC1-4560-B16D-2CA0B4D03E36}"/>
+            </ac:grpSpMkLst>
+          </pc:grpChg>
           <pc:grpChg chg="del">
             <ac:chgData name="Fabian Imaz" userId="b162d828-336d-4287-a4f3-91a93e080f29" providerId="ADAL" clId="{8D7B119D-814E-4B1A-809A-61644D08B2FA}" dt="2017-10-04T14:40:40.883" v="23" actId="478"/>
             <ac:grpSpMkLst>
@@ -1126,15 +1135,6 @@
               <pc:sldMasterMk cId="702745799" sldId="2147483658"/>
               <pc:sldLayoutMk cId="0" sldId="2147483660"/>
               <ac:grpSpMk id="111" creationId="{87376B41-B862-42DF-AFB3-31BAF38DDDA9}"/>
-            </ac:grpSpMkLst>
-          </pc:grpChg>
-          <pc:grpChg chg="add mod">
-            <ac:chgData name="Fabian Imaz" userId="b162d828-336d-4287-a4f3-91a93e080f29" providerId="ADAL" clId="{8D7B119D-814E-4B1A-809A-61644D08B2FA}" dt="2017-10-09T22:34:31.937" v="45" actId="1076"/>
-            <ac:grpSpMkLst>
-              <pc:docMk/>
-              <pc:sldMasterMk cId="702745799" sldId="2147483658"/>
-              <pc:sldLayoutMk cId="0" sldId="2147483660"/>
-              <ac:grpSpMk id="111" creationId="{1CC7FA66-1BC1-4560-B16D-2CA0B4D03E36}"/>
             </ac:grpSpMkLst>
           </pc:grpChg>
           <pc:grpChg chg="add mod">

</xml_diff>